<commit_message>
added articles function in presentation
</commit_message>
<xml_diff>
--- a/test.pptx
+++ b/test.pptx
@@ -268,10 +268,24 @@
             <a:spLocks noGrp="1" noRot="1" noChangeAspect="1"/>
           </p:cNvSpPr>
           <p:nvPr>
-            <p:ph type="sldImg" idx="2"/>
-          </p:nvPr>
-        </p:nvSpPr>
-        <p:spPr/>
+            <p:ph type="sldImg"/>
+          </p:nvPr>
+        </p:nvSpPr>
+        <p:spPr>
+          <a:xfrm>
+            <a:off x="685800" y="1143000"/>
+            <a:ext cx="5486400" cy="3086100"/>
+          </a:xfrm>
+          <a:prstGeom prst="rect">
+            <a:avLst/>
+          </a:prstGeom>
+          <a:noFill/>
+          <a:ln w="12700">
+            <a:solidFill>
+              <a:prstClr val="black"/>
+            </a:solidFill>
+          </a:ln>
+        </p:spPr>
       </p:sp>
       <p:sp>
         <p:nvSpPr>
@@ -280,111 +294,32 @@
             <a:spLocks noGrp="1"/>
           </p:cNvSpPr>
           <p:nvPr>
-            <p:ph type="body" sz="quarter" idx="3"/>
-          </p:nvPr>
-        </p:nvSpPr>
-        <p:spPr/>
-        <p:txBody>
-          <a:bodyPr/>
-          <a:lstStyle/>
-          <a:p>
-            <a:endParaRPr/>
-          </a:p>
-          <a:p>
-            <a:r>
-              <a:rPr>
-                <a:hlinkClick r:id="rId3"/>
-              </a:rPr>
-              <a:t>https://he.wikipedia.org/wiki/%D7%A9%D7%A8%D7%A9%D7%A8%D7%AA_%D7%9E%D7%A8%D7%A7%D7%95%D7%91</a:t>
-            </a:r>
-          </a:p>
-          <a:p>
-            <a:r>
-              <a:rPr>
-                <a:hlinkClick r:id="rId4"/>
-              </a:rPr>
-              <a:t>https://en.wikipedia.org/wiki/Markov_chain</a:t>
-            </a:r>
-          </a:p>
-          <a:p>
-            <a:r>
-              <a:rPr>
-                <a:hlinkClick r:id="rId5"/>
-              </a:rPr>
-              <a:t>http://setosa.io/ev/markov-chains/</a:t>
-            </a:r>
-          </a:p>
-          <a:p>
-            <a:r>
-              <a:rPr>
-                <a:hlinkClick r:id="rId6"/>
-              </a:rPr>
-              <a:t>https://brilliant.org/wiki/markov-chains/</a:t>
-            </a:r>
-          </a:p>
-          <a:p>
-            <a:r>
-              <a:rPr>
-                <a:hlinkClick r:id="rId7"/>
-              </a:rPr>
-              <a:t>https://www.dartmouth.edu/~chance/teaching_aids/books_articles/probability_book/Chapter11.pdf</a:t>
-            </a:r>
-          </a:p>
-          <a:p>
-            <a:r>
-              <a:rPr>
-                <a:hlinkClick r:id="rId8"/>
-              </a:rPr>
-              <a:t>https://towardsdatascience.com/introduction-to-markov-chains-50da3645a50d</a:t>
-            </a:r>
-          </a:p>
-          <a:p>
-            <a:r>
-              <a:rPr>
-                <a:hlinkClick r:id="rId9"/>
-              </a:rPr>
-              <a:t>http://mathworld.wolfram.com/MarkovChain.html</a:t>
-            </a:r>
-          </a:p>
-          <a:p>
-            <a:r>
-              <a:rPr>
-                <a:hlinkClick r:id="rId10"/>
-              </a:rPr>
-              <a:t>https://nlp.stanford.edu/IR-book/html/htmledition/markov-chains-1.html</a:t>
-            </a:r>
-          </a:p>
-          <a:p>
-            <a:r>
-              <a:rPr>
-                <a:hlinkClick r:id="rId11"/>
-              </a:rPr>
-              <a:t>https://hackernoon.com/create-a-twitter-politician-bot-with-markov-chains-node-js-and-stdlib-14df8cc1c68a</a:t>
-            </a:r>
-          </a:p>
-          <a:p>
-            <a:r>
-              <a:rPr>
-                <a:hlinkClick r:id="rId12"/>
-              </a:rPr>
-              <a:t>https://hackernoon.com/generating-music-using-markov-chains-40c3f3f46405</a:t>
-            </a:r>
-          </a:p>
-        </p:txBody>
-      </p:sp>
-      <p:sp>
-        <p:nvSpPr>
-          <p:cNvPr id="4" name="Slide Number Placeholder 3"/>
-          <p:cNvSpPr>
-            <a:spLocks noGrp="1"/>
-          </p:cNvSpPr>
-          <p:nvPr>
-            <p:ph type="sldNum" sz="quarter" idx="5"/>
-          </p:nvPr>
-        </p:nvSpPr>
-        <p:spPr/>
+            <p:ph type="body" idx="1"/>
+          </p:nvPr>
+        </p:nvSpPr>
+        <p:spPr>
+          <a:xfrm>
+            <a:off x="685800" y="4400550"/>
+            <a:ext cx="5486400" cy="3600450"/>
+          </a:xfrm>
+          <a:prstGeom prst="rect">
+            <a:avLst/>
+          </a:prstGeom>
+        </p:spPr>
+        <p:txBody>
+          <a:bodyPr/>
+          <a:lstStyle/>
+          <a:p>
+            <a:endParaRPr lang="en-US" dirty="0"/>
+          </a:p>
+        </p:txBody>
       </p:sp>
     </p:spTree>
+    <p:extLst>
+      <p:ext uri="{BB962C8B-B14F-4D97-AF65-F5344CB8AC3E}">
+        <p14:creationId xmlns:p14="http://schemas.microsoft.com/office/powerpoint/2010/main" val="1226793481"/>
+      </p:ext>
+    </p:extLst>
   </p:cSld>
   <p:clrMapOvr>
     <a:masterClrMapping/>
@@ -436,87 +371,9 @@
           <a:bodyPr/>
           <a:lstStyle/>
           <a:p>
-            <a:endParaRPr/>
-          </a:p>
-          <a:p>
-            <a:r>
-              <a:rPr>
-                <a:hlinkClick r:id="rId3"/>
-              </a:rPr>
-              <a:t>https://en.wikipedia.org/wiki/ELIZA</a:t>
-            </a:r>
-          </a:p>
-          <a:p>
-            <a:r>
-              <a:rPr>
-                <a:hlinkClick r:id="rId4"/>
-              </a:rPr>
-              <a:t>http://www.manifestation.com/neurotoys/eliza.php3</a:t>
-            </a:r>
-          </a:p>
-          <a:p>
-            <a:r>
-              <a:rPr>
-                <a:hlinkClick r:id="rId5"/>
-              </a:rPr>
-              <a:t>http://www.med-ai.com/models/eliza.html</a:t>
-            </a:r>
-          </a:p>
-          <a:p>
-            <a:r>
-              <a:rPr>
-                <a:hlinkClick r:id="rId6"/>
-              </a:rPr>
-              <a:t>https://www.cyberpsych.org/eliza/</a:t>
-            </a:r>
-          </a:p>
-          <a:p>
-            <a:r>
-              <a:rPr>
-                <a:hlinkClick r:id="rId7"/>
-              </a:rPr>
-              <a:t>https://www.chatbots.org/chatbot/eliza/</a:t>
-            </a:r>
-          </a:p>
-          <a:p>
-            <a:r>
-              <a:rPr>
-                <a:hlinkClick r:id="rId8"/>
-              </a:rPr>
-              <a:t>http://hps.elte.hu/~gk/Eliza/</a:t>
-            </a:r>
-          </a:p>
-          <a:p>
-            <a:r>
-              <a:rPr>
-                <a:hlinkClick r:id="rId9"/>
-              </a:rPr>
-              <a:t>http://www.cs.nott.ac.uk/~pszgxk/courses/g5aiai/002history/eliza.htm</a:t>
-            </a:r>
-          </a:p>
-          <a:p>
-            <a:r>
-              <a:rPr>
-                <a:hlinkClick r:id="rId10"/>
-              </a:rPr>
-              <a:t>https://apps.facebook.com/eliza-chatbot/</a:t>
-            </a:r>
-          </a:p>
-          <a:p>
-            <a:r>
-              <a:rPr>
-                <a:hlinkClick r:id="rId11"/>
-              </a:rPr>
-              <a:t>https://www.theatlantic.com/technology/archive/2014/06/when-parry-met-eliza-a-ridiculous-chatbot-conversation-from-1972/372428/</a:t>
-            </a:r>
-          </a:p>
-          <a:p>
-            <a:r>
-              <a:rPr>
-                <a:hlinkClick r:id="rId12"/>
-              </a:rPr>
-              <a:t>http://psych.fullerton.edu/mbirnbaum/psych101/Eliza.htm</a:t>
-            </a:r>
+            <a:endParaRPr dirty="0">
+              <a:hlinkClick r:id="rId3"/>
+            </a:endParaRPr>
           </a:p>
         </p:txBody>
       </p:sp>
@@ -533,6 +390,240 @@
         <p:spPr/>
       </p:sp>
     </p:spTree>
+  </p:cSld>
+  <p:clrMapOvr>
+    <a:masterClrMapping/>
+  </p:clrMapOvr>
+</p:notes>
+</file>
+
+<file path=ppt/notesSlides/notesSlide3.xml><?xml version="1.0" encoding="utf-8"?>
+<p:notes xmlns:a="http://schemas.openxmlformats.org/drawingml/2006/main" xmlns:r="http://schemas.openxmlformats.org/officeDocument/2006/relationships" xmlns:p="http://schemas.openxmlformats.org/presentationml/2006/main">
+  <p:cSld>
+    <p:spTree>
+      <p:nvGrpSpPr>
+        <p:cNvPr id="1" name=""/>
+        <p:cNvGrpSpPr/>
+        <p:nvPr/>
+      </p:nvGrpSpPr>
+      <p:grpSpPr>
+        <a:xfrm>
+          <a:off x="0" y="0"/>
+          <a:ext cx="0" cy="0"/>
+          <a:chOff x="0" y="0"/>
+          <a:chExt cx="0" cy="0"/>
+        </a:xfrm>
+      </p:grpSpPr>
+      <p:sp>
+        <p:nvSpPr>
+          <p:cNvPr id="2" name="Slide Image Placeholder 1"/>
+          <p:cNvSpPr>
+            <a:spLocks noGrp="1" noRot="1" noChangeAspect="1"/>
+          </p:cNvSpPr>
+          <p:nvPr>
+            <p:ph type="sldImg" idx="2"/>
+          </p:nvPr>
+        </p:nvSpPr>
+        <p:spPr/>
+      </p:sp>
+      <p:sp>
+        <p:nvSpPr>
+          <p:cNvPr id="3" name="Notes Placeholder 2"/>
+          <p:cNvSpPr>
+            <a:spLocks noGrp="1"/>
+          </p:cNvSpPr>
+          <p:nvPr>
+            <p:ph type="body" sz="quarter" idx="3"/>
+          </p:nvPr>
+        </p:nvSpPr>
+        <p:spPr/>
+        <p:txBody>
+          <a:bodyPr/>
+          <a:lstStyle/>
+          <a:p>
+            <a:endParaRPr dirty="0"/>
+          </a:p>
+        </p:txBody>
+      </p:sp>
+      <p:sp>
+        <p:nvSpPr>
+          <p:cNvPr id="4" name="Slide Number Placeholder 3"/>
+          <p:cNvSpPr>
+            <a:spLocks noGrp="1"/>
+          </p:cNvSpPr>
+          <p:nvPr>
+            <p:ph type="sldNum" sz="quarter" idx="5"/>
+          </p:nvPr>
+        </p:nvSpPr>
+        <p:spPr/>
+      </p:sp>
+    </p:spTree>
+  </p:cSld>
+  <p:clrMapOvr>
+    <a:masterClrMapping/>
+  </p:clrMapOvr>
+</p:notes>
+</file>
+
+<file path=ppt/notesSlides/notesSlide4.xml><?xml version="1.0" encoding="utf-8"?>
+<p:notes xmlns:a="http://schemas.openxmlformats.org/drawingml/2006/main" xmlns:r="http://schemas.openxmlformats.org/officeDocument/2006/relationships" xmlns:p="http://schemas.openxmlformats.org/presentationml/2006/main">
+  <p:cSld>
+    <p:spTree>
+      <p:nvGrpSpPr>
+        <p:cNvPr id="1" name=""/>
+        <p:cNvGrpSpPr/>
+        <p:nvPr/>
+      </p:nvGrpSpPr>
+      <p:grpSpPr>
+        <a:xfrm>
+          <a:off x="0" y="0"/>
+          <a:ext cx="0" cy="0"/>
+          <a:chOff x="0" y="0"/>
+          <a:chExt cx="0" cy="0"/>
+        </a:xfrm>
+      </p:grpSpPr>
+      <p:sp>
+        <p:nvSpPr>
+          <p:cNvPr id="2" name="Slide Image Placeholder 1"/>
+          <p:cNvSpPr>
+            <a:spLocks noGrp="1" noRot="1" noChangeAspect="1"/>
+          </p:cNvSpPr>
+          <p:nvPr>
+            <p:ph type="sldImg"/>
+          </p:nvPr>
+        </p:nvSpPr>
+        <p:spPr>
+          <a:xfrm>
+            <a:off x="685800" y="1143000"/>
+            <a:ext cx="5486400" cy="3086100"/>
+          </a:xfrm>
+          <a:prstGeom prst="rect">
+            <a:avLst/>
+          </a:prstGeom>
+          <a:noFill/>
+          <a:ln w="12700">
+            <a:solidFill>
+              <a:prstClr val="black"/>
+            </a:solidFill>
+          </a:ln>
+        </p:spPr>
+      </p:sp>
+      <p:sp>
+        <p:nvSpPr>
+          <p:cNvPr id="3" name="Notes Placeholder 2"/>
+          <p:cNvSpPr>
+            <a:spLocks noGrp="1"/>
+          </p:cNvSpPr>
+          <p:nvPr>
+            <p:ph type="body" idx="1"/>
+          </p:nvPr>
+        </p:nvSpPr>
+        <p:spPr>
+          <a:xfrm>
+            <a:off x="685800" y="4400550"/>
+            <a:ext cx="5486400" cy="3600450"/>
+          </a:xfrm>
+          <a:prstGeom prst="rect">
+            <a:avLst/>
+          </a:prstGeom>
+        </p:spPr>
+        <p:txBody>
+          <a:bodyPr/>
+          <a:lstStyle/>
+          <a:p>
+            <a:endParaRPr lang="en-US" dirty="0"/>
+          </a:p>
+        </p:txBody>
+      </p:sp>
+    </p:spTree>
+    <p:extLst>
+      <p:ext uri="{BB962C8B-B14F-4D97-AF65-F5344CB8AC3E}">
+        <p14:creationId xmlns:p14="http://schemas.microsoft.com/office/powerpoint/2010/main" val="1404488208"/>
+      </p:ext>
+    </p:extLst>
+  </p:cSld>
+  <p:clrMapOvr>
+    <a:masterClrMapping/>
+  </p:clrMapOvr>
+</p:notes>
+</file>
+
+<file path=ppt/notesSlides/notesSlide5.xml><?xml version="1.0" encoding="utf-8"?>
+<p:notes xmlns:a="http://schemas.openxmlformats.org/drawingml/2006/main" xmlns:r="http://schemas.openxmlformats.org/officeDocument/2006/relationships" xmlns:p="http://schemas.openxmlformats.org/presentationml/2006/main">
+  <p:cSld>
+    <p:spTree>
+      <p:nvGrpSpPr>
+        <p:cNvPr id="1" name=""/>
+        <p:cNvGrpSpPr/>
+        <p:nvPr/>
+      </p:nvGrpSpPr>
+      <p:grpSpPr>
+        <a:xfrm>
+          <a:off x="0" y="0"/>
+          <a:ext cx="0" cy="0"/>
+          <a:chOff x="0" y="0"/>
+          <a:chExt cx="0" cy="0"/>
+        </a:xfrm>
+      </p:grpSpPr>
+      <p:sp>
+        <p:nvSpPr>
+          <p:cNvPr id="2" name="Slide Image Placeholder 1"/>
+          <p:cNvSpPr>
+            <a:spLocks noGrp="1" noRot="1" noChangeAspect="1"/>
+          </p:cNvSpPr>
+          <p:nvPr>
+            <p:ph type="sldImg"/>
+          </p:nvPr>
+        </p:nvSpPr>
+        <p:spPr>
+          <a:xfrm>
+            <a:off x="685800" y="1143000"/>
+            <a:ext cx="5486400" cy="3086100"/>
+          </a:xfrm>
+          <a:prstGeom prst="rect">
+            <a:avLst/>
+          </a:prstGeom>
+          <a:noFill/>
+          <a:ln w="12700">
+            <a:solidFill>
+              <a:prstClr val="black"/>
+            </a:solidFill>
+          </a:ln>
+        </p:spPr>
+      </p:sp>
+      <p:sp>
+        <p:nvSpPr>
+          <p:cNvPr id="3" name="Notes Placeholder 2"/>
+          <p:cNvSpPr>
+            <a:spLocks noGrp="1"/>
+          </p:cNvSpPr>
+          <p:nvPr>
+            <p:ph type="body" idx="1"/>
+          </p:nvPr>
+        </p:nvSpPr>
+        <p:spPr>
+          <a:xfrm>
+            <a:off x="685800" y="4400550"/>
+            <a:ext cx="5486400" cy="3600450"/>
+          </a:xfrm>
+          <a:prstGeom prst="rect">
+            <a:avLst/>
+          </a:prstGeom>
+        </p:spPr>
+        <p:txBody>
+          <a:bodyPr/>
+          <a:lstStyle/>
+          <a:p>
+            <a:endParaRPr lang="en-US" dirty="0"/>
+          </a:p>
+        </p:txBody>
+      </p:sp>
+    </p:spTree>
+    <p:extLst>
+      <p:ext uri="{BB962C8B-B14F-4D97-AF65-F5344CB8AC3E}">
+        <p14:creationId xmlns:p14="http://schemas.microsoft.com/office/powerpoint/2010/main" val="2665970603"/>
+      </p:ext>
+    </p:extLst>
   </p:cSld>
   <p:clrMapOvr>
     <a:masterClrMapping/>

</xml_diff>